<commit_message>
DevOps pro europe release
</commit_message>
<xml_diff>
--- a/220526 - DevOps Pro Europe @Vilnius/Serverless Containers with Azure, Containers Instances & Apps.pptx
+++ b/220526 - DevOps Pro Europe @Vilnius/Serverless Containers with Azure, Containers Instances & Apps.pptx
@@ -216,7 +216,7 @@
                   <a:bodyPr/>
                   <a:lstStyle/>
                   <a:p>
-                    <a:fld id="{67C6D280-8DE4-4968-8BC4-7A6F4DBF5EA8}" type="CELLRANGE">
+                    <a:fld id="{F5B097C7-E2D3-4C48-B23D-22054E9E2471}" type="CELLRANGE">
                       <a:rPr lang="it-IT"/>
                       <a:pPr/>
                       <a:t>[CELLRANGE]</a:t>
@@ -250,7 +250,7 @@
                   <a:bodyPr/>
                   <a:lstStyle/>
                   <a:p>
-                    <a:fld id="{2E6F45B1-553E-47DF-B63A-45701BC9079F}" type="CELLRANGE">
+                    <a:fld id="{831E8851-961B-4288-B794-C557ABC5E2CB}" type="CELLRANGE">
                       <a:rPr lang="it-IT"/>
                       <a:pPr/>
                       <a:t>[CELLRANGE]</a:t>
@@ -284,7 +284,7 @@
                   <a:bodyPr/>
                   <a:lstStyle/>
                   <a:p>
-                    <a:fld id="{BB28AFC5-5269-48EE-9E56-875BA6220C11}" type="CELLRANGE">
+                    <a:fld id="{69791FE8-ED93-47E1-B1C1-4E7A4D1AA021}" type="CELLRANGE">
                       <a:rPr lang="it-IT"/>
                       <a:pPr/>
                       <a:t>[CELLRANGE]</a:t>
@@ -318,7 +318,7 @@
                   <a:bodyPr/>
                   <a:lstStyle/>
                   <a:p>
-                    <a:fld id="{98E93A1F-F645-4620-AB12-D9423B5FEE5D}" type="CELLRANGE">
+                    <a:fld id="{23556A48-FB09-460F-BC77-7B329060BFD4}" type="CELLRANGE">
                       <a:rPr lang="it-IT"/>
                       <a:pPr/>
                       <a:t>[CELLRANGE]</a:t>
@@ -352,7 +352,7 @@
                   <a:bodyPr/>
                   <a:lstStyle/>
                   <a:p>
-                    <a:fld id="{A6D014AD-D757-41AA-9E3E-6C9818DD8FC3}" type="CELLRANGE">
+                    <a:fld id="{4C6B01A8-3243-44DE-9CC9-E499E8E06963}" type="CELLRANGE">
                       <a:rPr lang="it-IT"/>
                       <a:pPr/>
                       <a:t>[CELLRANGE]</a:t>
@@ -386,7 +386,7 @@
                   <a:bodyPr/>
                   <a:lstStyle/>
                   <a:p>
-                    <a:fld id="{6C4A61A6-DD49-4A04-8DD7-BC3701FB55E6}" type="CELLRANGE">
+                    <a:fld id="{CA0FB30B-48FA-4B57-B8DF-0016CF5D9A32}" type="CELLRANGE">
                       <a:rPr lang="it-IT"/>
                       <a:pPr/>
                       <a:t>[CELLRANGE]</a:t>
@@ -420,7 +420,7 @@
                   <a:bodyPr/>
                   <a:lstStyle/>
                   <a:p>
-                    <a:fld id="{40B3EAF8-1129-446B-A92D-7269C3938944}" type="CELLRANGE">
+                    <a:fld id="{4F7691C4-F94B-4BC8-846A-DEA861E173B6}" type="CELLRANGE">
                       <a:rPr lang="it-IT"/>
                       <a:pPr/>
                       <a:t>[CELLRANGE]</a:t>
@@ -454,7 +454,7 @@
                   <a:bodyPr/>
                   <a:lstStyle/>
                   <a:p>
-                    <a:fld id="{48DE6769-7D83-437D-9C23-4E8BF29A64FB}" type="CELLRANGE">
+                    <a:fld id="{E67510F4-F2AB-4C86-A19E-1B3E8ED9FEB5}" type="CELLRANGE">
                       <a:rPr lang="it-IT"/>
                       <a:pPr/>
                       <a:t>[CELLRANGE]</a:t>
@@ -1082,7 +1082,7 @@
                   <a:bodyPr/>
                   <a:lstStyle/>
                   <a:p>
-                    <a:fld id="{1EF7285E-AF57-41A1-BB85-3FEAD5E0E0F3}" type="CELLRANGE">
+                    <a:fld id="{A0C8E062-1600-424D-AE43-ACDA2A66AFED}" type="CELLRANGE">
                       <a:rPr lang="it-IT"/>
                       <a:pPr/>
                       <a:t>[CELLRANGE]</a:t>
@@ -1116,7 +1116,7 @@
                   <a:bodyPr/>
                   <a:lstStyle/>
                   <a:p>
-                    <a:fld id="{FB97CF50-F9D4-4BA7-9E4F-39969EB571AB}" type="CELLRANGE">
+                    <a:fld id="{F52B8EFB-525C-428D-8CA7-6DC7C19BDD6C}" type="CELLRANGE">
                       <a:rPr lang="it-IT"/>
                       <a:pPr/>
                       <a:t>[CELLRANGE]</a:t>
@@ -1150,7 +1150,7 @@
                   <a:bodyPr/>
                   <a:lstStyle/>
                   <a:p>
-                    <a:fld id="{5ADD72FE-16C5-47C9-9DBB-3CC2C09AA1B1}" type="CELLRANGE">
+                    <a:fld id="{3602DA56-0B2F-4E96-9530-72BF02A75689}" type="CELLRANGE">
                       <a:rPr lang="it-IT"/>
                       <a:pPr/>
                       <a:t>[CELLRANGE]</a:t>
@@ -1184,7 +1184,7 @@
                   <a:bodyPr/>
                   <a:lstStyle/>
                   <a:p>
-                    <a:fld id="{5A192226-7296-4AB0-B073-93509148F564}" type="CELLRANGE">
+                    <a:fld id="{157CD647-6762-4DB9-8B5A-B41F09E4286E}" type="CELLRANGE">
                       <a:rPr lang="it-IT"/>
                       <a:pPr/>
                       <a:t>[CELLRANGE]</a:t>
@@ -1218,7 +1218,7 @@
                   <a:bodyPr/>
                   <a:lstStyle/>
                   <a:p>
-                    <a:fld id="{AA055495-FFB8-40C3-8E7D-8E1BC8761AEE}" type="CELLRANGE">
+                    <a:fld id="{5AD8B015-06A1-4397-86A6-7CD55FAD5C77}" type="CELLRANGE">
                       <a:rPr lang="it-IT"/>
                       <a:pPr/>
                       <a:t>[CELLRANGE]</a:t>
@@ -1252,7 +1252,7 @@
                   <a:bodyPr/>
                   <a:lstStyle/>
                   <a:p>
-                    <a:fld id="{C2236AA4-DBFC-48FB-996F-E25461F0D58A}" type="CELLRANGE">
+                    <a:fld id="{6D540A90-0177-4FBB-81AD-27890E359462}" type="CELLRANGE">
                       <a:rPr lang="it-IT"/>
                       <a:pPr/>
                       <a:t>[CELLRANGE]</a:t>
@@ -1286,7 +1286,7 @@
                   <a:bodyPr/>
                   <a:lstStyle/>
                   <a:p>
-                    <a:fld id="{183392F4-0449-4172-BC21-B1F9CF19F526}" type="CELLRANGE">
+                    <a:fld id="{D7D11C8C-47C9-434F-A408-7F7CB0B642E7}" type="CELLRANGE">
                       <a:rPr lang="it-IT"/>
                       <a:pPr/>
                       <a:t>[CELLRANGE]</a:t>
@@ -1320,7 +1320,7 @@
                   <a:bodyPr/>
                   <a:lstStyle/>
                   <a:p>
-                    <a:fld id="{1B6409A1-F60D-4627-8CC6-B3BAE61E546F}" type="CELLRANGE">
+                    <a:fld id="{99E83337-C16E-497C-9B21-80149A88D7CE}" type="CELLRANGE">
                       <a:rPr lang="it-IT"/>
                       <a:pPr/>
                       <a:t>[CELLRANGE]</a:t>
@@ -5937,7 +5937,7 @@
           <a:p>
             <a:fld id="{80680FBE-A8DF-4758-9AC4-3A9E1039168F}" type="datetimeFigureOut">
               <a:rPr lang="en-US" smtClean="0"/>
-              <a:t>5/25/2022</a:t>
+              <a:t>5/26/2022</a:t>
             </a:fld>
             <a:endParaRPr lang="en-US" dirty="0"/>
           </a:p>
@@ -6102,7 +6102,7 @@
           <a:p>
             <a:fld id="{EC13577B-6902-467D-A26C-08A0DD5E4E03}" type="datetimeFigureOut">
               <a:rPr lang="en-US" smtClean="0"/>
-              <a:t>5/25/2022</a:t>
+              <a:t>5/26/2022</a:t>
             </a:fld>
             <a:endParaRPr lang="en-US" dirty="0"/>
           </a:p>
@@ -7300,7 +7300,7 @@
             <a:fld id="{8BEEBAAA-29B5-4AF5-BC5F-7E580C29002D}" type="datetimeFigureOut">
               <a:rPr lang="en-US" smtClean="0"/>
               <a:pPr/>
-              <a:t>5/25/2022</a:t>
+              <a:t>5/26/2022</a:t>
             </a:fld>
             <a:endParaRPr lang="en-US" dirty="0"/>
           </a:p>
@@ -7866,7 +7866,7 @@
           <a:p>
             <a:fld id="{6E678713-7E1F-43C3-9D84-8A8808E7FFCF}" type="datetimeFigureOut">
               <a:rPr lang="en-US" smtClean="0"/>
-              <a:t>5/25/2022</a:t>
+              <a:t>5/26/2022</a:t>
             </a:fld>
             <a:endParaRPr lang="en-US"/>
           </a:p>
@@ -8139,7 +8139,7 @@
             <a:fld id="{8BEEBAAA-29B5-4AF5-BC5F-7E580C29002D}" type="datetimeFigureOut">
               <a:rPr lang="en-US" smtClean="0"/>
               <a:pPr/>
-              <a:t>5/25/2022</a:t>
+              <a:t>5/26/2022</a:t>
             </a:fld>
             <a:endParaRPr lang="en-US" dirty="0"/>
           </a:p>
@@ -9001,112 +9001,6 @@
   <p:clrMapOvr>
     <a:masterClrMapping/>
   </p:clrMapOvr>
-  <p:timing>
-    <p:tnLst>
-      <p:par>
-        <p:cTn id="1" dur="indefinite" restart="never" nodeType="tmRoot">
-          <p:childTnLst>
-            <p:seq concurrent="1" nextAc="seek">
-              <p:cTn id="2" dur="indefinite" nodeType="mainSeq">
-                <p:childTnLst>
-                  <p:par>
-                    <p:cTn id="3" fill="hold">
-                      <p:stCondLst>
-                        <p:cond delay="indefinite"/>
-                      </p:stCondLst>
-                      <p:childTnLst>
-                        <p:par>
-                          <p:cTn id="4" fill="hold">
-                            <p:stCondLst>
-                              <p:cond delay="0"/>
-                            </p:stCondLst>
-                            <p:childTnLst>
-                              <p:par>
-                                <p:cTn id="5" presetID="1" presetClass="entr" presetSubtype="0" fill="hold" grpId="0" nodeType="clickEffect">
-                                  <p:stCondLst>
-                                    <p:cond delay="0"/>
-                                  </p:stCondLst>
-                                  <p:childTnLst>
-                                    <p:set>
-                                      <p:cBhvr>
-                                        <p:cTn id="6" dur="1" fill="hold">
-                                          <p:stCondLst>
-                                            <p:cond delay="0"/>
-                                          </p:stCondLst>
-                                        </p:cTn>
-                                        <p:tgtEl>
-                                          <p:spTgt spid="3"/>
-                                        </p:tgtEl>
-                                        <p:attrNameLst>
-                                          <p:attrName>style.visibility</p:attrName>
-                                        </p:attrNameLst>
-                                      </p:cBhvr>
-                                      <p:to>
-                                        <p:strVal val="visible"/>
-                                      </p:to>
-                                    </p:set>
-                                  </p:childTnLst>
-                                </p:cTn>
-                              </p:par>
-                              <p:par>
-                                <p:cTn id="7" presetID="1" presetClass="entr" presetSubtype="0" fill="hold" grpId="0" nodeType="withEffect">
-                                  <p:stCondLst>
-                                    <p:cond delay="0"/>
-                                  </p:stCondLst>
-                                  <p:childTnLst>
-                                    <p:set>
-                                      <p:cBhvr>
-                                        <p:cTn id="8" dur="1" fill="hold">
-                                          <p:stCondLst>
-                                            <p:cond delay="0"/>
-                                          </p:stCondLst>
-                                        </p:cTn>
-                                        <p:tgtEl>
-                                          <p:spTgt spid="5"/>
-                                        </p:tgtEl>
-                                        <p:attrNameLst>
-                                          <p:attrName>style.visibility</p:attrName>
-                                        </p:attrNameLst>
-                                      </p:cBhvr>
-                                      <p:to>
-                                        <p:strVal val="visible"/>
-                                      </p:to>
-                                    </p:set>
-                                  </p:childTnLst>
-                                </p:cTn>
-                              </p:par>
-                            </p:childTnLst>
-                          </p:cTn>
-                        </p:par>
-                      </p:childTnLst>
-                    </p:cTn>
-                  </p:par>
-                </p:childTnLst>
-              </p:cTn>
-              <p:prevCondLst>
-                <p:cond evt="onPrev" delay="0">
-                  <p:tgtEl>
-                    <p:sldTgt/>
-                  </p:tgtEl>
-                </p:cond>
-              </p:prevCondLst>
-              <p:nextCondLst>
-                <p:cond evt="onNext" delay="0">
-                  <p:tgtEl>
-                    <p:sldTgt/>
-                  </p:tgtEl>
-                </p:cond>
-              </p:nextCondLst>
-            </p:seq>
-          </p:childTnLst>
-        </p:cTn>
-      </p:par>
-    </p:tnLst>
-    <p:bldLst>
-      <p:bldP spid="3" grpId="0"/>
-      <p:bldP spid="5" grpId="0" animBg="1"/>
-    </p:bldLst>
-  </p:timing>
 </p:sld>
 </file>
 
@@ -10304,6 +10198,23 @@
 </file>
 
 <file path=customXml/item1.xml><?xml version="1.0" encoding="utf-8"?>
+<p:properties xmlns:p="http://schemas.microsoft.com/office/2006/metadata/properties" xmlns:xsi="http://www.w3.org/2001/XMLSchema-instance" xmlns:pc="http://schemas.microsoft.com/office/infopath/2007/PartnerControls">
+  <documentManagement>
+    <MediaServiceKeyPoints xmlns="71af3243-3dd4-4a8d-8c0d-dd76da1f02a5" xsi:nil="true"/>
+  </documentManagement>
+</p:properties>
+</file>
+
+<file path=customXml/item2.xml><?xml version="1.0" encoding="utf-8"?>
+<?mso-contentType ?>
+<FormTemplates xmlns="http://schemas.microsoft.com/sharepoint/v3/contenttype/forms">
+  <Display>DocumentLibraryForm</Display>
+  <Edit>DocumentLibraryForm</Edit>
+  <New>DocumentLibraryForm</New>
+</FormTemplates>
+</file>
+
+<file path=customXml/item3.xml><?xml version="1.0" encoding="utf-8"?>
 <ct:contentTypeSchema xmlns:ct="http://schemas.microsoft.com/office/2006/metadata/contentType" xmlns:ma="http://schemas.microsoft.com/office/2006/metadata/properties/metaAttributes" ct:_="" ma:_="" ma:contentTypeName="Document" ma:contentTypeID="0x01010079F111ED35F8CC479449609E8A0923A6" ma:contentTypeVersion="11" ma:contentTypeDescription="Create a new document." ma:contentTypeScope="" ma:versionID="96291512c1ee715ab617f4c07df79fc1">
   <xsd:schema xmlns:xsd="http://www.w3.org/2001/XMLSchema" xmlns:xs="http://www.w3.org/2001/XMLSchema" xmlns:p="http://schemas.microsoft.com/office/2006/metadata/properties" xmlns:ns2="71af3243-3dd4-4a8d-8c0d-dd76da1f02a5" xmlns:ns3="16c05727-aa75-4e4a-9b5f-8a80a1165891" targetNamespace="http://schemas.microsoft.com/office/2006/metadata/properties" ma:root="true" ma:fieldsID="8256c27c40ca5c40ce1cf6c44f0205df" ns2:_="" ns3:_="">
     <xsd:import namespace="71af3243-3dd4-4a8d-8c0d-dd76da1f02a5"/>
@@ -10514,24 +10425,32 @@
 </ct:contentTypeSchema>
 </file>
 
-<file path=customXml/item2.xml><?xml version="1.0" encoding="utf-8"?>
-<?mso-contentType ?>
-<FormTemplates xmlns="http://schemas.microsoft.com/sharepoint/v3/contenttype/forms">
-  <Display>DocumentLibraryForm</Display>
-  <Edit>DocumentLibraryForm</Edit>
-  <New>DocumentLibraryForm</New>
-</FormTemplates>
+<file path=customXml/itemProps1.xml><?xml version="1.0" encoding="utf-8"?>
+<ds:datastoreItem xmlns:ds="http://schemas.openxmlformats.org/officeDocument/2006/customXml" ds:itemID="{7BED6A94-6CEC-4690-B5D0-3E831BCC769C}">
+  <ds:schemaRefs>
+    <ds:schemaRef ds:uri="http://purl.org/dc/terms/"/>
+    <ds:schemaRef ds:uri="http://schemas.openxmlformats.org/package/2006/metadata/core-properties"/>
+    <ds:schemaRef ds:uri="16c05727-aa75-4e4a-9b5f-8a80a1165891"/>
+    <ds:schemaRef ds:uri="http://purl.org/dc/dcmitype/"/>
+    <ds:schemaRef ds:uri="http://schemas.microsoft.com/office/infopath/2007/PartnerControls"/>
+    <ds:schemaRef ds:uri="http://schemas.microsoft.com/office/2006/documentManagement/types"/>
+    <ds:schemaRef ds:uri="http://purl.org/dc/elements/1.1/"/>
+    <ds:schemaRef ds:uri="http://schemas.microsoft.com/office/2006/metadata/properties"/>
+    <ds:schemaRef ds:uri="71af3243-3dd4-4a8d-8c0d-dd76da1f02a5"/>
+    <ds:schemaRef ds:uri="http://www.w3.org/XML/1998/namespace"/>
+  </ds:schemaRefs>
+</ds:datastoreItem>
 </file>
 
-<file path=customXml/item3.xml><?xml version="1.0" encoding="utf-8"?>
-<p:properties xmlns:p="http://schemas.microsoft.com/office/2006/metadata/properties" xmlns:xsi="http://www.w3.org/2001/XMLSchema-instance" xmlns:pc="http://schemas.microsoft.com/office/infopath/2007/PartnerControls">
-  <documentManagement>
-    <MediaServiceKeyPoints xmlns="71af3243-3dd4-4a8d-8c0d-dd76da1f02a5" xsi:nil="true"/>
-  </documentManagement>
-</p:properties>
+<file path=customXml/itemProps2.xml><?xml version="1.0" encoding="utf-8"?>
+<ds:datastoreItem xmlns:ds="http://schemas.openxmlformats.org/officeDocument/2006/customXml" ds:itemID="{A68F36FF-D6F8-4F25-B1D6-7893F2294B63}">
+  <ds:schemaRefs>
+    <ds:schemaRef ds:uri="http://schemas.microsoft.com/sharepoint/v3/contenttype/forms"/>
+  </ds:schemaRefs>
+</ds:datastoreItem>
 </file>
 
-<file path=customXml/itemProps1.xml><?xml version="1.0" encoding="utf-8"?>
+<file path=customXml/itemProps3.xml><?xml version="1.0" encoding="utf-8"?>
 <ds:datastoreItem xmlns:ds="http://schemas.openxmlformats.org/officeDocument/2006/customXml" ds:itemID="{E60B3179-FCE1-482B-B473-8B7BB6F9AC8B}">
   <ds:schemaRefs>
     <ds:schemaRef ds:uri="http://schemas.microsoft.com/office/2006/metadata/contentType"/>
@@ -10548,22 +10467,4 @@
     <ds:schemaRef ds:uri="http://schemas.microsoft.com/internal/obd"/>
   </ds:schemaRefs>
 </ds:datastoreItem>
-</file>
-
-<file path=customXml/itemProps2.xml><?xml version="1.0" encoding="utf-8"?>
-<ds:datastoreItem xmlns:ds="http://schemas.openxmlformats.org/officeDocument/2006/customXml" ds:itemID="{A68F36FF-D6F8-4F25-B1D6-7893F2294B63}">
-  <ds:schemaRefs>
-    <ds:schemaRef ds:uri="http://schemas.microsoft.com/sharepoint/v3/contenttype/forms"/>
-  </ds:schemaRefs>
-</ds:datastoreItem>
-</file>
-
-<file path=customXml/itemProps3.xml><?xml version="1.0" encoding="utf-8"?>
-<ds:datastoreItem xmlns:ds="http://schemas.openxmlformats.org/officeDocument/2006/customXml" ds:itemID="{7BED6A94-6CEC-4690-B5D0-3E831BCC769C}">
-  <ds:schemaRefs>
-    <ds:schemaRef ds:uri="http://schemas.microsoft.com/office/2006/metadata/properties"/>
-    <ds:schemaRef ds:uri="http://schemas.microsoft.com/office/infopath/2007/PartnerControls"/>
-    <ds:schemaRef ds:uri="71af3243-3dd4-4a8d-8c0d-dd76da1f02a5"/>
-  </ds:schemaRefs>
-</ds:datastoreItem>
 </file>
</xml_diff>